<commit_message>
update document and example.
</commit_message>
<xml_diff>
--- a/sa/文档/2019 软件体系结构（05）：适配器模式.pptx
+++ b/sa/文档/2019 软件体系结构（05）：适配器模式.pptx
@@ -9,7 +9,8 @@
     <p:sldId id="257" r:id="rId4"/>
     <p:sldId id="258" r:id="rId5"/>
     <p:sldId id="259" r:id="rId6"/>
-    <p:sldId id="260" r:id="rId7"/>
+    <p:sldId id="261" r:id="rId7"/>
+    <p:sldId id="260" r:id="rId8"/>
   </p:sldIdLst>
   <p:sldSz cx="12192000" cy="6858000"/>
   <p:notesSz cx="7103745" cy="10234295"/>
@@ -2976,6 +2977,97 @@
           <a:bodyPr/>
           <a:p>
             <a:r>
+              <a:rPr lang="en-US" altLang="zh-CN"/>
+              <a:t>Android</a:t>
+            </a:r>
+            <a:r>
+              <a:rPr lang="zh-CN" altLang="en-US"/>
+              <a:t>中的各种</a:t>
+            </a:r>
+            <a:r>
+              <a:rPr lang="en-US" altLang="zh-CN"/>
+              <a:t>Adapter</a:t>
+            </a:r>
+            <a:endParaRPr lang="en-US" altLang="zh-CN"/>
+          </a:p>
+        </p:txBody>
+      </p:sp>
+      <p:sp>
+        <p:nvSpPr>
+          <p:cNvPr id="3" name="内容占位符 2"/>
+          <p:cNvSpPr>
+            <a:spLocks noGrp="1"/>
+          </p:cNvSpPr>
+          <p:nvPr>
+            <p:ph idx="1"/>
+          </p:nvPr>
+        </p:nvSpPr>
+        <p:spPr/>
+        <p:txBody>
+          <a:bodyPr/>
+          <a:p>
+            <a:r>
+              <a:rPr lang="zh-CN" altLang="en-US"/>
+              <a:t>同样是一个ListView，可以用不同的Adapter让它显示出来，比如说最常用的ArrayAdapter，SimpleAdapter，SimpleCursorAdapter，以及重写BaseAdapter等方法。</a:t>
+            </a:r>
+            <a:endParaRPr lang="zh-CN" altLang="en-US"/>
+          </a:p>
+          <a:p>
+            <a:r>
+              <a:rPr lang="zh-CN" altLang="en-US"/>
+              <a:t>ArrayAdapter比较简单，但它只能用于显示文字</a:t>
+            </a:r>
+            <a:endParaRPr lang="zh-CN" altLang="en-US"/>
+          </a:p>
+          <a:p>
+            <a:r>
+              <a:rPr lang="zh-CN" altLang="en-US"/>
+              <a:t>SimpleAdapter则有很强的扩展性，可以自定义出各种效果</a:t>
+            </a:r>
+            <a:endParaRPr lang="zh-CN" altLang="en-US"/>
+          </a:p>
+          <a:p>
+            <a:r>
+              <a:rPr lang="zh-CN" altLang="en-US"/>
+              <a:t>SimpleCursorAdapter则可以从数据库中读取数据显示在列表上，通过从写BaseAdapter可以在列表上加处理的事件等。</a:t>
+            </a:r>
+            <a:endParaRPr lang="zh-CN" altLang="en-US"/>
+          </a:p>
+        </p:txBody>
+      </p:sp>
+    </p:spTree>
+  </p:cSld>
+  <p:clrMapOvr>
+    <a:masterClrMapping/>
+  </p:clrMapOvr>
+</p:sld>
+</file>
+
+<file path=ppt/slides/slide6.xml><?xml version="1.0" encoding="utf-8"?>
+<p:sld xmlns:a="http://schemas.openxmlformats.org/drawingml/2006/main" xmlns:r="http://schemas.openxmlformats.org/officeDocument/2006/relationships" xmlns:p="http://schemas.openxmlformats.org/presentationml/2006/main">
+  <p:cSld>
+    <p:spTree>
+      <p:nvGrpSpPr>
+        <p:cNvPr id="1" name=""/>
+        <p:cNvGrpSpPr/>
+        <p:nvPr/>
+      </p:nvGrpSpPr>
+      <p:grpSpPr/>
+      <p:sp>
+        <p:nvSpPr>
+          <p:cNvPr id="2" name="标题 1"/>
+          <p:cNvSpPr>
+            <a:spLocks noGrp="1"/>
+          </p:cNvSpPr>
+          <p:nvPr>
+            <p:ph type="title"/>
+          </p:nvPr>
+        </p:nvSpPr>
+        <p:spPr/>
+        <p:txBody>
+          <a:bodyPr/>
+          <a:p>
+            <a:r>
               <a:rPr lang="zh-CN" altLang="en-US"/>
               <a:t>内容适配器</a:t>
             </a:r>

</xml_diff>